<commit_message>
some updates for the revision, look at narrow slice of domain for ssh
</commit_message>
<xml_diff>
--- a/demo_results_top_half_box.pptx
+++ b/demo_results_top_half_box.pptx
@@ -3494,7 +3494,7 @@
             <p:ph idx="1"/>
             <p:extLst>
               <p:ext uri="{D42A27DB-BD31-4B8C-83A1-F6EECF244321}">
-                <p14:modId xmlns:p14="http://schemas.microsoft.com/office/powerpoint/2010/main" val="936392573"/>
+                <p14:modId xmlns:p14="http://schemas.microsoft.com/office/powerpoint/2010/main" val="628847072"/>
               </p:ext>
             </p:extLst>
           </p:nvPr>
@@ -3709,7 +3709,7 @@
                       </a:pPr>
                       <a:r>
                         <a:rPr lang="en-US" dirty="0"/>
-                        <a:t>0.2306, 0.0014</a:t>
+                        <a:t>0.2306, 0.0015</a:t>
                       </a:r>
                     </a:p>
                   </a:txBody>
@@ -4183,10 +4183,9 @@
           </a:lstStyle>
           <a:p>
             <a:r>
-              <a:rPr lang="en-US"/>
+              <a:rPr lang="en-US" dirty="0"/>
               <a:t>2007</a:t>
             </a:r>
-            <a:endParaRPr lang="en-US" dirty="0"/>
           </a:p>
         </p:txBody>
       </p:sp>

</xml_diff>